<commit_message>
Solution updates for class XI
</commit_message>
<xml_diff>
--- a/XI class/02. DS and Algo - Module 2/04. Stack-And-Queue/01-Stack-and-Queue-Basics.pptx
+++ b/XI class/02. DS and Algo - Module 2/04. Stack-And-Queue/01-Stack-and-Queue-Basics.pptx
@@ -321,7 +321,7 @@
           <a:p>
             <a:fld id="{4E087215-0C8F-4762-A664-737A353EC9A4}" type="datetimeFigureOut">
               <a:rPr lang="bg-BG" smtClean="0"/>
-              <a:t>17.9.2023 г.</a:t>
+              <a:t>25.3.2024 г.</a:t>
             </a:fld>
             <a:endParaRPr lang="bg-BG"/>
           </a:p>
@@ -517,7 +517,7 @@
           <a:p>
             <a:fld id="{72D84649-876A-46C9-8472-14CB09C070D8}" type="datetimeFigureOut">
               <a:rPr lang="en-US" smtClean="0"/>
-              <a:t>9/17/2023</a:t>
+              <a:t>3/25/2024</a:t>
             </a:fld>
             <a:endParaRPr lang="en-US"/>
           </a:p>
@@ -15934,7 +15934,7 @@
               <a:rPr lang="en-US" sz="2399" b="1" dirty="0">
                 <a:latin typeface="Consolas" panose="020B0609020204030204" pitchFamily="49" charset="0"/>
               </a:rPr>
-              <a:t>adD 5 6</a:t>
+              <a:t>add 5 6</a:t>
             </a:r>
           </a:p>
           <a:p>
@@ -15942,7 +15942,7 @@
               <a:rPr lang="en-US" sz="2399" b="1" dirty="0">
                 <a:latin typeface="Consolas" panose="020B0609020204030204" pitchFamily="49" charset="0"/>
               </a:rPr>
-              <a:t>REmove 3</a:t>
+              <a:t>Remove 3</a:t>
             </a:r>
           </a:p>
           <a:p>
@@ -15950,7 +15950,7 @@
               <a:rPr lang="en-US" sz="2399" b="1" dirty="0">
                 <a:latin typeface="Consolas" panose="020B0609020204030204" pitchFamily="49" charset="0"/>
               </a:rPr>
-              <a:t>eNd</a:t>
+              <a:t>end</a:t>
             </a:r>
             <a:endParaRPr lang="en-US" sz="3999" b="1" noProof="1">
               <a:latin typeface="Consolas" panose="020B0609020204030204" pitchFamily="49" charset="0"/>

</xml_diff>